<commit_message>
#2 Datenbankabbild und Datenbankmodell
angepasst an letztes Team-Meeting:
- birthdate
- description
- uri => text
</commit_message>
<xml_diff>
--- a/Spezifikationen/CMS_Modell_Spezifikation.pptx
+++ b/Spezifikationen/CMS_Modell_Spezifikation.pptx
@@ -213,7 +213,7 @@
           <a:p>
             <a:fld id="{5FB9DE1E-9C59-4472-9BFE-872FCA557505}" type="datetimeFigureOut">
               <a:rPr lang="de-DE" smtClean="0"/>
-              <a:t>01.12.2016</a:t>
+              <a:t>11.12.2016</a:t>
             </a:fld>
             <a:endParaRPr lang="de-DE"/>
           </a:p>
@@ -1104,7 +1104,7 @@
           <a:p>
             <a:fld id="{A8397244-F09A-480D-A398-F059C842E541}" type="datetime1">
               <a:rPr lang="de-DE" smtClean="0"/>
-              <a:t>01.12.2016</a:t>
+              <a:t>11.12.2016</a:t>
             </a:fld>
             <a:endParaRPr lang="de-DE"/>
           </a:p>
@@ -1275,7 +1275,7 @@
           <a:p>
             <a:fld id="{4A0624FD-1E9C-442B-9A77-F7854ECD5C4B}" type="datetime1">
               <a:rPr lang="de-DE" smtClean="0"/>
-              <a:t>01.12.2016</a:t>
+              <a:t>11.12.2016</a:t>
             </a:fld>
             <a:endParaRPr lang="de-DE"/>
           </a:p>
@@ -1456,7 +1456,7 @@
           <a:p>
             <a:fld id="{0F97B927-A088-4873-98CF-029B6CB6D85E}" type="datetime1">
               <a:rPr lang="de-DE" smtClean="0"/>
-              <a:t>01.12.2016</a:t>
+              <a:t>11.12.2016</a:t>
             </a:fld>
             <a:endParaRPr lang="de-DE"/>
           </a:p>
@@ -1627,7 +1627,7 @@
           <a:p>
             <a:fld id="{D6663774-A100-4623-94BA-F6B6B53CC199}" type="datetime1">
               <a:rPr lang="de-DE" smtClean="0"/>
-              <a:t>01.12.2016</a:t>
+              <a:t>11.12.2016</a:t>
             </a:fld>
             <a:endParaRPr lang="de-DE"/>
           </a:p>
@@ -1875,7 +1875,7 @@
           <a:p>
             <a:fld id="{21A81475-685C-4B07-89AC-60C6EAAB6D4C}" type="datetime1">
               <a:rPr lang="de-DE" smtClean="0"/>
-              <a:t>01.12.2016</a:t>
+              <a:t>11.12.2016</a:t>
             </a:fld>
             <a:endParaRPr lang="de-DE"/>
           </a:p>
@@ -2163,7 +2163,7 @@
           <a:p>
             <a:fld id="{B2F9CB55-05F2-4296-95CC-14386AFD87D6}" type="datetime1">
               <a:rPr lang="de-DE" smtClean="0"/>
-              <a:t>01.12.2016</a:t>
+              <a:t>11.12.2016</a:t>
             </a:fld>
             <a:endParaRPr lang="de-DE"/>
           </a:p>
@@ -2585,7 +2585,7 @@
           <a:p>
             <a:fld id="{8E5BD420-9AB9-458C-81BE-DAFAA9902404}" type="datetime1">
               <a:rPr lang="de-DE" smtClean="0"/>
-              <a:t>01.12.2016</a:t>
+              <a:t>11.12.2016</a:t>
             </a:fld>
             <a:endParaRPr lang="de-DE"/>
           </a:p>
@@ -2705,7 +2705,7 @@
           <a:p>
             <a:fld id="{C644B812-3534-4884-8BE6-32A8F8B770F4}" type="datetime1">
               <a:rPr lang="de-DE" smtClean="0"/>
-              <a:t>01.12.2016</a:t>
+              <a:t>11.12.2016</a:t>
             </a:fld>
             <a:endParaRPr lang="de-DE"/>
           </a:p>
@@ -2803,7 +2803,7 @@
           <a:p>
             <a:fld id="{A8F29B9A-F350-418A-A942-E37D8F967607}" type="datetime1">
               <a:rPr lang="de-DE" smtClean="0"/>
-              <a:t>01.12.2016</a:t>
+              <a:t>11.12.2016</a:t>
             </a:fld>
             <a:endParaRPr lang="de-DE"/>
           </a:p>
@@ -3081,7 +3081,7 @@
           <a:p>
             <a:fld id="{D76FCF4F-E669-4E72-9162-ADDF332D172D}" type="datetime1">
               <a:rPr lang="de-DE" smtClean="0"/>
-              <a:t>01.12.2016</a:t>
+              <a:t>11.12.2016</a:t>
             </a:fld>
             <a:endParaRPr lang="de-DE"/>
           </a:p>
@@ -3336,7 +3336,7 @@
           <a:p>
             <a:fld id="{FCC29BEE-D49A-4984-9A0D-EA18D67C6542}" type="datetime1">
               <a:rPr lang="de-DE" smtClean="0"/>
-              <a:t>01.12.2016</a:t>
+              <a:t>11.12.2016</a:t>
             </a:fld>
             <a:endParaRPr lang="de-DE"/>
           </a:p>
@@ -3550,7 +3550,7 @@
           <a:p>
             <a:fld id="{176F2E55-DA60-42A3-9F60-D110BF06A931}" type="datetime1">
               <a:rPr lang="de-DE" smtClean="0"/>
-              <a:t>01.12.2016</a:t>
+              <a:t>11.12.2016</a:t>
             </a:fld>
             <a:endParaRPr lang="de-DE"/>
           </a:p>
@@ -4626,14 +4626,14 @@
           <p:nvPr>
             <p:extLst>
               <p:ext uri="{D42A27DB-BD31-4B8C-83A1-F6EECF244321}">
-                <p14:modId xmlns:p14="http://schemas.microsoft.com/office/powerpoint/2010/main" val="991538200"/>
+                <p14:modId xmlns:p14="http://schemas.microsoft.com/office/powerpoint/2010/main" val="3034755276"/>
               </p:ext>
             </p:extLst>
           </p:nvPr>
         </p:nvGraphicFramePr>
         <p:xfrm>
           <a:off x="4499992" y="104567"/>
-          <a:ext cx="1944216" cy="2100297"/>
+          <a:ext cx="1944216" cy="2331720"/>
         </p:xfrm>
         <a:graphic>
           <a:graphicData uri="http://schemas.openxmlformats.org/drawingml/2006/table">
@@ -4693,7 +4693,7 @@
                   </a:ext>
                 </a:extLst>
               </a:tr>
-              <a:tr h="1825977">
+              <a:tr h="2057400">
                 <a:tc>
                   <a:txBody>
                     <a:bodyPr/>
@@ -5058,6 +5058,99 @@
                         </a:rPr>
                         <a:t> kein Default-Wert</a:t>
                       </a:r>
+                    </a:p>
+                    <a:p>
+                      <a:pPr marL="0" marR="0" lvl="0" indent="0" algn="l" defTabSz="914400" rtl="0" eaLnBrk="1" fontAlgn="auto" latinLnBrk="0" hangingPunct="1">
+                        <a:lnSpc>
+                          <a:spcPct val="100000"/>
+                        </a:lnSpc>
+                        <a:spcBef>
+                          <a:spcPts val="0"/>
+                        </a:spcBef>
+                        <a:spcAft>
+                          <a:spcPts val="0"/>
+                        </a:spcAft>
+                        <a:buClrTx/>
+                        <a:buSzTx/>
+                        <a:buFontTx/>
+                        <a:buNone/>
+                        <a:tabLst/>
+                        <a:defRPr/>
+                      </a:pPr>
+                      <a:r>
+                        <a:rPr lang="de-DE" sz="1100" u="none" baseline="0" dirty="0" err="1">
+                          <a:latin typeface="Arial" panose="020B0604020202020204" pitchFamily="34" charset="0"/>
+                          <a:cs typeface="Arial" panose="020B0604020202020204" pitchFamily="34" charset="0"/>
+                          <a:sym typeface="Wingdings" panose="05000000000000000000" pitchFamily="2" charset="2"/>
+                        </a:rPr>
+                        <a:t>birthdate</a:t>
+                      </a:r>
+                      <a:r>
+                        <a:rPr lang="de-DE" sz="1100" u="none" baseline="0" dirty="0">
+                          <a:latin typeface="Arial" panose="020B0604020202020204" pitchFamily="34" charset="0"/>
+                          <a:cs typeface="Arial" panose="020B0604020202020204" pitchFamily="34" charset="0"/>
+                          <a:sym typeface="Wingdings" panose="05000000000000000000" pitchFamily="2" charset="2"/>
+                        </a:rPr>
+                        <a:t> </a:t>
+                      </a:r>
+                      <a:r>
+                        <a:rPr lang="de-DE" sz="600" u="none" kern="1200" baseline="0" dirty="0">
+                          <a:solidFill>
+                            <a:srgbClr val="C00000"/>
+                          </a:solidFill>
+                          <a:latin typeface="Arial" panose="020B0604020202020204" pitchFamily="34" charset="0"/>
+                          <a:ea typeface="+mn-ea"/>
+                          <a:cs typeface="Arial" panose="020B0604020202020204" pitchFamily="34" charset="0"/>
+                          <a:sym typeface="Wingdings" panose="05000000000000000000" pitchFamily="2" charset="2"/>
+                        </a:rPr>
+                        <a:t>=&gt; </a:t>
+                      </a:r>
+                      <a:r>
+                        <a:rPr lang="de-DE" sz="600" u="none" kern="1200" baseline="0" dirty="0" err="1">
+                          <a:solidFill>
+                            <a:srgbClr val="C00000"/>
+                          </a:solidFill>
+                          <a:latin typeface="Arial" panose="020B0604020202020204" pitchFamily="34" charset="0"/>
+                          <a:ea typeface="+mn-ea"/>
+                          <a:cs typeface="Arial" panose="020B0604020202020204" pitchFamily="34" charset="0"/>
+                          <a:sym typeface="Wingdings" panose="05000000000000000000" pitchFamily="2" charset="2"/>
+                        </a:rPr>
+                        <a:t>date</a:t>
+                      </a:r>
+                      <a:r>
+                        <a:rPr lang="de-DE" sz="600" u="none" kern="1200" baseline="0" dirty="0">
+                          <a:solidFill>
+                            <a:srgbClr val="C00000"/>
+                          </a:solidFill>
+                          <a:latin typeface="Arial" panose="020B0604020202020204" pitchFamily="34" charset="0"/>
+                          <a:ea typeface="+mn-ea"/>
+                          <a:cs typeface="Arial" panose="020B0604020202020204" pitchFamily="34" charset="0"/>
+                          <a:sym typeface="Wingdings" panose="05000000000000000000" pitchFamily="2" charset="2"/>
+                        </a:rPr>
+                        <a:t>,</a:t>
+                      </a:r>
+                      <a:r>
+                        <a:rPr lang="de-DE" sz="800" u="none" baseline="0" dirty="0">
+                          <a:solidFill>
+                            <a:srgbClr val="00B0F0"/>
+                          </a:solidFill>
+                          <a:latin typeface="Arial" panose="020B0604020202020204" pitchFamily="34" charset="0"/>
+                          <a:cs typeface="Arial" panose="020B0604020202020204" pitchFamily="34" charset="0"/>
+                          <a:sym typeface="Wingdings" panose="05000000000000000000" pitchFamily="2" charset="2"/>
+                        </a:rPr>
+                        <a:t> </a:t>
+                      </a:r>
+                      <a:r>
+                        <a:rPr lang="de-DE" sz="600" u="none" baseline="0" dirty="0">
+                          <a:solidFill>
+                            <a:srgbClr val="00B0F0"/>
+                          </a:solidFill>
+                          <a:latin typeface="Arial" panose="020B0604020202020204" pitchFamily="34" charset="0"/>
+                          <a:cs typeface="Arial" panose="020B0604020202020204" pitchFamily="34" charset="0"/>
+                          <a:sym typeface="Wingdings" panose="05000000000000000000" pitchFamily="2" charset="2"/>
+                        </a:rPr>
+                        <a:t>kein Default-Wert</a:t>
+                      </a:r>
                       <a:endParaRPr lang="de-DE" sz="600" u="none" kern="1200" baseline="0" dirty="0">
                         <a:solidFill>
                           <a:srgbClr val="C00000"/>
@@ -5433,11 +5526,6 @@
                         </a:rPr>
                         <a:t>kein Default-Wert</a:t>
                       </a:r>
-                      <a:endParaRPr lang="de-DE" sz="600" u="none" baseline="0" dirty="0">
-                        <a:latin typeface="Arial" panose="020B0604020202020204" pitchFamily="34" charset="0"/>
-                        <a:cs typeface="Arial" panose="020B0604020202020204" pitchFamily="34" charset="0"/>
-                        <a:sym typeface="Wingdings" panose="05000000000000000000" pitchFamily="2" charset="2"/>
-                      </a:endParaRPr>
                     </a:p>
                   </a:txBody>
                   <a:tcPr/>
@@ -5461,7 +5549,7 @@
           <p:nvPr>
             <p:extLst>
               <p:ext uri="{D42A27DB-BD31-4B8C-83A1-F6EECF244321}">
-                <p14:modId xmlns:p14="http://schemas.microsoft.com/office/powerpoint/2010/main" val="4165976261"/>
+                <p14:modId xmlns:p14="http://schemas.microsoft.com/office/powerpoint/2010/main" val="3174655584"/>
               </p:ext>
             </p:extLst>
           </p:nvPr>
@@ -5711,7 +5799,7 @@
                           <a:cs typeface="Arial" panose="020B0604020202020204" pitchFamily="34" charset="0"/>
                           <a:sym typeface="Wingdings" panose="05000000000000000000" pitchFamily="2" charset="2"/>
                         </a:rPr>
-                        <a:t>varchar</a:t>
+                        <a:t>text</a:t>
                       </a:r>
                       <a:r>
                         <a:rPr lang="de-DE" sz="600" u="none" kern="1200" baseline="0" dirty="0">
@@ -5723,7 +5811,7 @@
                           <a:cs typeface="Arial" panose="020B0604020202020204" pitchFamily="34" charset="0"/>
                           <a:sym typeface="Wingdings" panose="05000000000000000000" pitchFamily="2" charset="2"/>
                         </a:rPr>
-                        <a:t>[767] </a:t>
+                        <a:t> </a:t>
                       </a:r>
                       <a:r>
                         <a:rPr lang="de-DE" sz="600" u="none" baseline="0" dirty="0">
@@ -6244,14 +6332,14 @@
           <p:nvPr>
             <p:extLst>
               <p:ext uri="{D42A27DB-BD31-4B8C-83A1-F6EECF244321}">
-                <p14:modId xmlns:p14="http://schemas.microsoft.com/office/powerpoint/2010/main" val="2898582316"/>
+                <p14:modId xmlns:p14="http://schemas.microsoft.com/office/powerpoint/2010/main" val="3094227903"/>
               </p:ext>
             </p:extLst>
           </p:nvPr>
         </p:nvGraphicFramePr>
         <p:xfrm>
           <a:off x="3347864" y="2924944"/>
-          <a:ext cx="1800200" cy="2034966"/>
+          <a:ext cx="1800200" cy="2148840"/>
         </p:xfrm>
         <a:graphic>
           <a:graphicData uri="http://schemas.openxmlformats.org/drawingml/2006/table">
@@ -6318,7 +6406,7 @@
                   </a:ext>
                 </a:extLst>
               </a:tr>
-              <a:tr h="1760646">
+              <a:tr h="1874520">
                 <a:tc>
                   <a:txBody>
                     <a:bodyPr/>
@@ -6869,6 +6957,89 @@
                           <a:sym typeface="Wingdings" panose="05000000000000000000" pitchFamily="2" charset="2"/>
                         </a:rPr>
                         <a:t>tinyint</a:t>
+                      </a:r>
+                      <a:r>
+                        <a:rPr lang="de-DE" sz="600" u="none" kern="1200" baseline="0" dirty="0">
+                          <a:solidFill>
+                            <a:srgbClr val="00B0F0"/>
+                          </a:solidFill>
+                          <a:latin typeface="Arial" panose="020B0604020202020204" pitchFamily="34" charset="0"/>
+                          <a:ea typeface="+mn-ea"/>
+                          <a:cs typeface="Arial" panose="020B0604020202020204" pitchFamily="34" charset="0"/>
+                          <a:sym typeface="Wingdings" panose="05000000000000000000" pitchFamily="2" charset="2"/>
+                        </a:rPr>
+                        <a:t>, FALSE</a:t>
+                      </a:r>
+                    </a:p>
+                    <a:p>
+                      <a:pPr marL="0" marR="0" lvl="0" indent="0" algn="l" defTabSz="914400" rtl="0" eaLnBrk="1" fontAlgn="auto" latinLnBrk="0" hangingPunct="1">
+                        <a:lnSpc>
+                          <a:spcPct val="100000"/>
+                        </a:lnSpc>
+                        <a:spcBef>
+                          <a:spcPts val="0"/>
+                        </a:spcBef>
+                        <a:spcAft>
+                          <a:spcPts val="0"/>
+                        </a:spcAft>
+                        <a:buClrTx/>
+                        <a:buSzTx/>
+                        <a:buFontTx/>
+                        <a:buNone/>
+                        <a:tabLst/>
+                        <a:defRPr/>
+                      </a:pPr>
+                      <a:r>
+                        <a:rPr lang="de-DE" sz="1100" u="none" baseline="0" dirty="0" err="1">
+                          <a:latin typeface="Arial" panose="020B0604020202020204" pitchFamily="34" charset="0"/>
+                          <a:cs typeface="Arial" panose="020B0604020202020204" pitchFamily="34" charset="0"/>
+                          <a:sym typeface="Wingdings" panose="05000000000000000000" pitchFamily="2" charset="2"/>
+                        </a:rPr>
+                        <a:t>description</a:t>
+                      </a:r>
+                      <a:r>
+                        <a:rPr lang="de-DE" sz="1100" u="none" baseline="0" dirty="0">
+                          <a:latin typeface="Arial" panose="020B0604020202020204" pitchFamily="34" charset="0"/>
+                          <a:cs typeface="Arial" panose="020B0604020202020204" pitchFamily="34" charset="0"/>
+                          <a:sym typeface="Wingdings" panose="05000000000000000000" pitchFamily="2" charset="2"/>
+                        </a:rPr>
+                        <a:t> </a:t>
+                      </a:r>
+                      <a:r>
+                        <a:rPr lang="de-DE" sz="600" u="none" kern="1200" baseline="0" dirty="0">
+                          <a:solidFill>
+                            <a:srgbClr val="C00000"/>
+                          </a:solidFill>
+                          <a:latin typeface="Arial" panose="020B0604020202020204" pitchFamily="34" charset="0"/>
+                          <a:ea typeface="+mn-ea"/>
+                          <a:cs typeface="Arial" panose="020B0604020202020204" pitchFamily="34" charset="0"/>
+                          <a:sym typeface="Wingdings" panose="05000000000000000000" pitchFamily="2" charset="2"/>
+                        </a:rPr>
+                        <a:t>=&gt; </a:t>
+                      </a:r>
+                      <a:r>
+                        <a:rPr lang="de-DE" sz="600" u="none" kern="1200" baseline="0" dirty="0" err="1">
+                          <a:solidFill>
+                            <a:srgbClr val="C00000"/>
+                          </a:solidFill>
+                          <a:latin typeface="Arial" panose="020B0604020202020204" pitchFamily="34" charset="0"/>
+                          <a:ea typeface="+mn-ea"/>
+                          <a:cs typeface="Arial" panose="020B0604020202020204" pitchFamily="34" charset="0"/>
+                          <a:sym typeface="Wingdings" panose="05000000000000000000" pitchFamily="2" charset="2"/>
+                        </a:rPr>
+                        <a:t>varchar</a:t>
+                      </a:r>
+                      <a:r>
+                        <a:rPr lang="de-DE" sz="600" u="none" kern="1200" baseline="0" dirty="0">
+                          <a:solidFill>
+                            <a:srgbClr val="C00000"/>
+                          </a:solidFill>
+                          <a:latin typeface="Arial" panose="020B0604020202020204" pitchFamily="34" charset="0"/>
+                          <a:ea typeface="+mn-ea"/>
+                          <a:cs typeface="Arial" panose="020B0604020202020204" pitchFamily="34" charset="0"/>
+                          <a:sym typeface="Wingdings" panose="05000000000000000000" pitchFamily="2" charset="2"/>
+                        </a:rPr>
+                        <a:t>[500]</a:t>
                       </a:r>
                       <a:r>
                         <a:rPr lang="de-DE" sz="600" u="none" kern="1200" baseline="0" dirty="0">
@@ -6905,13 +7076,13 @@
           <p:nvPr>
             <p:extLst>
               <p:ext uri="{D42A27DB-BD31-4B8C-83A1-F6EECF244321}">
-                <p14:modId xmlns:p14="http://schemas.microsoft.com/office/powerpoint/2010/main" val="345476742"/>
+                <p14:modId xmlns:p14="http://schemas.microsoft.com/office/powerpoint/2010/main" val="2209966677"/>
               </p:ext>
             </p:extLst>
           </p:nvPr>
         </p:nvGraphicFramePr>
         <p:xfrm>
-          <a:off x="1619672" y="3384862"/>
+          <a:off x="1619672" y="3428407"/>
           <a:ext cx="1334243" cy="1143000"/>
         </p:xfrm>
         <a:graphic>
@@ -7255,13 +7426,13 @@
           <p:nvPr>
             <p:extLst>
               <p:ext uri="{D42A27DB-BD31-4B8C-83A1-F6EECF244321}">
-                <p14:modId xmlns:p14="http://schemas.microsoft.com/office/powerpoint/2010/main" val="2417435580"/>
+                <p14:modId xmlns:p14="http://schemas.microsoft.com/office/powerpoint/2010/main" val="2456249933"/>
               </p:ext>
             </p:extLst>
           </p:nvPr>
         </p:nvGraphicFramePr>
         <p:xfrm>
-          <a:off x="35496" y="3384862"/>
+          <a:off x="35496" y="3428407"/>
           <a:ext cx="1296144" cy="1143000"/>
         </p:xfrm>
         <a:graphic>
@@ -8217,7 +8388,7 @@
           <p:nvPr>
             <p:extLst>
               <p:ext uri="{D42A27DB-BD31-4B8C-83A1-F6EECF244321}">
-                <p14:modId xmlns:p14="http://schemas.microsoft.com/office/powerpoint/2010/main" val="456954698"/>
+                <p14:modId xmlns:p14="http://schemas.microsoft.com/office/powerpoint/2010/main" val="688344358"/>
               </p:ext>
             </p:extLst>
           </p:nvPr>
@@ -8558,7 +8729,7 @@
                           <a:cs typeface="Arial" panose="020B0604020202020204" pitchFamily="34" charset="0"/>
                           <a:sym typeface="Wingdings" panose="05000000000000000000" pitchFamily="2" charset="2"/>
                         </a:rPr>
-                        <a:t>varchar</a:t>
+                        <a:t>text</a:t>
                       </a:r>
                       <a:r>
                         <a:rPr lang="de-DE" sz="600" u="none" kern="1200" baseline="0" dirty="0">
@@ -8570,7 +8741,7 @@
                           <a:cs typeface="Arial" panose="020B0604020202020204" pitchFamily="34" charset="0"/>
                           <a:sym typeface="Wingdings" panose="05000000000000000000" pitchFamily="2" charset="2"/>
                         </a:rPr>
-                        <a:t>[767],</a:t>
+                        <a:t>, </a:t>
                       </a:r>
                       <a:r>
                         <a:rPr lang="de-DE" sz="600" u="none" baseline="0" dirty="0">
@@ -8581,30 +8752,7 @@
                           <a:cs typeface="Arial" panose="020B0604020202020204" pitchFamily="34" charset="0"/>
                           <a:sym typeface="Wingdings" panose="05000000000000000000" pitchFamily="2" charset="2"/>
                         </a:rPr>
-                        <a:t> </a:t>
-                      </a:r>
-                      <a:r>
-                        <a:rPr lang="de-DE" sz="600" u="none" kern="1200" baseline="0" dirty="0">
-                          <a:solidFill>
-                            <a:srgbClr val="C00000"/>
-                          </a:solidFill>
-                          <a:latin typeface="Arial" panose="020B0604020202020204" pitchFamily="34" charset="0"/>
-                          <a:ea typeface="+mn-ea"/>
-                          <a:cs typeface="Arial" panose="020B0604020202020204" pitchFamily="34" charset="0"/>
-                          <a:sym typeface="Wingdings" panose="05000000000000000000" pitchFamily="2" charset="2"/>
-                        </a:rPr>
-                        <a:t> </a:t>
-                      </a:r>
-                      <a:r>
-                        <a:rPr lang="de-DE" sz="600" u="none" baseline="0" dirty="0">
-                          <a:solidFill>
-                            <a:srgbClr val="00B0F0"/>
-                          </a:solidFill>
-                          <a:latin typeface="Arial" panose="020B0604020202020204" pitchFamily="34" charset="0"/>
-                          <a:cs typeface="Arial" panose="020B0604020202020204" pitchFamily="34" charset="0"/>
-                          <a:sym typeface="Wingdings" panose="05000000000000000000" pitchFamily="2" charset="2"/>
-                        </a:rPr>
-                        <a:t>kein Default-Wert</a:t>
+                        <a:t>ein Default-Wert</a:t>
                       </a:r>
                       <a:endParaRPr lang="de-DE" sz="600" u="none" kern="1200" baseline="0" dirty="0">
                         <a:solidFill>
@@ -8713,8 +8861,8 @@
         </p:nvCxnSpPr>
         <p:spPr>
           <a:xfrm rot="16200000" flipV="1">
-            <a:off x="5446226" y="2152697"/>
-            <a:ext cx="2247992" cy="252028"/>
+            <a:off x="5504082" y="2210553"/>
+            <a:ext cx="2132280" cy="252028"/>
           </a:xfrm>
           <a:prstGeom prst="bentConnector2">
             <a:avLst/>
@@ -8830,8 +8978,8 @@
         </p:nvCxnSpPr>
         <p:spPr>
           <a:xfrm flipV="1">
-            <a:off x="4247756" y="4959910"/>
-            <a:ext cx="208" cy="334948"/>
+            <a:off x="4247756" y="5073784"/>
+            <a:ext cx="208" cy="221074"/>
           </a:xfrm>
           <a:prstGeom prst="straightConnector1">
             <a:avLst/>
@@ -8869,8 +9017,8 @@
         </p:nvCxnSpPr>
         <p:spPr>
           <a:xfrm rot="5400000" flipH="1" flipV="1">
-            <a:off x="4499992" y="1952836"/>
-            <a:ext cx="720080" cy="1224136"/>
+            <a:off x="4615704" y="2068548"/>
+            <a:ext cx="488657" cy="1224136"/>
           </a:xfrm>
           <a:prstGeom prst="bentConnector3">
             <a:avLst>
@@ -8910,8 +9058,8 @@
         </p:nvCxnSpPr>
         <p:spPr>
           <a:xfrm flipH="1">
-            <a:off x="2953915" y="3942427"/>
-            <a:ext cx="393949" cy="13935"/>
+            <a:off x="2953915" y="3999364"/>
+            <a:ext cx="393949" cy="543"/>
           </a:xfrm>
           <a:prstGeom prst="straightConnector1">
             <a:avLst/>
@@ -8949,7 +9097,7 @@
         </p:nvCxnSpPr>
         <p:spPr>
           <a:xfrm flipH="1">
-            <a:off x="1331640" y="3956362"/>
+            <a:off x="1331640" y="3999907"/>
             <a:ext cx="288032" cy="0"/>
           </a:xfrm>
           <a:prstGeom prst="straightConnector1">
@@ -10624,14 +10772,14 @@
           <p:nvPr>
             <p:extLst>
               <p:ext uri="{D42A27DB-BD31-4B8C-83A1-F6EECF244321}">
-                <p14:modId xmlns:p14="http://schemas.microsoft.com/office/powerpoint/2010/main" val="1914402726"/>
+                <p14:modId xmlns:p14="http://schemas.microsoft.com/office/powerpoint/2010/main" val="2355224073"/>
               </p:ext>
             </p:extLst>
           </p:nvPr>
         </p:nvGraphicFramePr>
         <p:xfrm>
           <a:off x="4499992" y="229603"/>
-          <a:ext cx="1224136" cy="1708803"/>
+          <a:ext cx="1224136" cy="1874520"/>
         </p:xfrm>
         <a:graphic>
           <a:graphicData uri="http://schemas.openxmlformats.org/drawingml/2006/table">
@@ -10691,7 +10839,7 @@
                   </a:ext>
                 </a:extLst>
               </a:tr>
-              <a:tr h="1434483">
+              <a:tr h="1600200">
                 <a:tc>
                   <a:txBody>
                     <a:bodyPr/>
@@ -10815,10 +10963,46 @@
                         </a:rPr>
                         <a:t>firstname</a:t>
                       </a:r>
+                      <a:endParaRPr lang="de-DE" sz="1100" u="none" baseline="0" dirty="0">
+                        <a:latin typeface="Arial" panose="020B0604020202020204" pitchFamily="34" charset="0"/>
+                        <a:cs typeface="Arial" panose="020B0604020202020204" pitchFamily="34" charset="0"/>
+                        <a:sym typeface="Wingdings" panose="05000000000000000000" pitchFamily="2" charset="2"/>
+                      </a:endParaRPr>
+                    </a:p>
+                    <a:p>
+                      <a:pPr marL="0" marR="0" lvl="0" indent="0" algn="l" defTabSz="914400" rtl="0" eaLnBrk="1" fontAlgn="auto" latinLnBrk="0" hangingPunct="1">
+                        <a:lnSpc>
+                          <a:spcPct val="100000"/>
+                        </a:lnSpc>
+                        <a:spcBef>
+                          <a:spcPts val="0"/>
+                        </a:spcBef>
+                        <a:spcAft>
+                          <a:spcPts val="0"/>
+                        </a:spcAft>
+                        <a:buClrTx/>
+                        <a:buSzTx/>
+                        <a:buFontTx/>
+                        <a:buNone/>
+                        <a:tabLst/>
+                        <a:defRPr/>
+                      </a:pPr>
+                      <a:r>
+                        <a:rPr lang="de-DE" sz="1100" u="none" kern="1200" baseline="0" dirty="0" err="1">
+                          <a:solidFill>
+                            <a:schemeClr val="tx1"/>
+                          </a:solidFill>
+                          <a:latin typeface="Arial" panose="020B0604020202020204" pitchFamily="34" charset="0"/>
+                          <a:ea typeface="+mn-ea"/>
+                          <a:cs typeface="Arial" panose="020B0604020202020204" pitchFamily="34" charset="0"/>
+                          <a:sym typeface="Wingdings" panose="05000000000000000000" pitchFamily="2" charset="2"/>
+                        </a:rPr>
+                        <a:t>birthdate</a:t>
+                      </a:r>
                       <a:r>
                         <a:rPr lang="de-DE" sz="600" u="none" kern="1200" baseline="0" dirty="0">
                           <a:solidFill>
-                            <a:srgbClr val="C00000"/>
+                            <a:schemeClr val="tx1"/>
                           </a:solidFill>
                           <a:latin typeface="Arial" panose="020B0604020202020204" pitchFamily="34" charset="0"/>
                           <a:ea typeface="+mn-ea"/>
@@ -11323,14 +11507,14 @@
           <p:nvPr>
             <p:extLst>
               <p:ext uri="{D42A27DB-BD31-4B8C-83A1-F6EECF244321}">
-                <p14:modId xmlns:p14="http://schemas.microsoft.com/office/powerpoint/2010/main" val="2953408577"/>
+                <p14:modId xmlns:p14="http://schemas.microsoft.com/office/powerpoint/2010/main" val="3886491636"/>
               </p:ext>
             </p:extLst>
           </p:nvPr>
         </p:nvGraphicFramePr>
         <p:xfrm>
-          <a:off x="3491880" y="2618170"/>
-          <a:ext cx="936104" cy="1785762"/>
+          <a:off x="3491880" y="2564904"/>
+          <a:ext cx="936104" cy="1874520"/>
         </p:xfrm>
         <a:graphic>
           <a:graphicData uri="http://schemas.openxmlformats.org/drawingml/2006/table">
@@ -11397,7 +11581,7 @@
                   </a:ext>
                 </a:extLst>
               </a:tr>
-              <a:tr h="1511442">
+              <a:tr h="1600200">
                 <a:tc>
                   <a:txBody>
                     <a:bodyPr/>
@@ -11543,9 +11727,29 @@
                         </a:rPr>
                         <a:t>public</a:t>
                       </a:r>
+                      <a:endParaRPr lang="de-DE" sz="1100" u="none" baseline="0" dirty="0">
+                        <a:latin typeface="Arial" panose="020B0604020202020204" pitchFamily="34" charset="0"/>
+                        <a:cs typeface="Arial" panose="020B0604020202020204" pitchFamily="34" charset="0"/>
+                        <a:sym typeface="Wingdings" panose="05000000000000000000" pitchFamily="2" charset="2"/>
+                      </a:endParaRPr>
+                    </a:p>
+                    <a:p>
+                      <a:pPr marL="0" algn="l" defTabSz="914400" rtl="0" eaLnBrk="1" latinLnBrk="0" hangingPunct="1"/>
+                      <a:r>
+                        <a:rPr lang="de-DE" sz="1100" u="none" kern="1200" baseline="0" dirty="0" err="1">
+                          <a:solidFill>
+                            <a:schemeClr val="tx1"/>
+                          </a:solidFill>
+                          <a:latin typeface="Arial" panose="020B0604020202020204" pitchFamily="34" charset="0"/>
+                          <a:ea typeface="+mn-ea"/>
+                          <a:cs typeface="Arial" panose="020B0604020202020204" pitchFamily="34" charset="0"/>
+                          <a:sym typeface="Wingdings" panose="05000000000000000000" pitchFamily="2" charset="2"/>
+                        </a:rPr>
+                        <a:t>description</a:t>
+                      </a:r>
                       <a:endParaRPr lang="de-DE" sz="600" u="none" kern="1200" baseline="0" dirty="0">
                         <a:solidFill>
-                          <a:srgbClr val="00B0F0"/>
+                          <a:schemeClr val="tx1"/>
                         </a:solidFill>
                         <a:latin typeface="Arial" panose="020B0604020202020204" pitchFamily="34" charset="0"/>
                         <a:ea typeface="+mn-ea"/>
@@ -12643,8 +12847,8 @@
         </p:nvCxnSpPr>
         <p:spPr>
           <a:xfrm rot="16200000" flipV="1">
-            <a:off x="4798035" y="2010098"/>
-            <a:ext cx="2318703" cy="466516"/>
+            <a:off x="4839464" y="2051527"/>
+            <a:ext cx="2235844" cy="466516"/>
           </a:xfrm>
           <a:prstGeom prst="bentConnector2">
             <a:avLst/>
@@ -12760,8 +12964,8 @@
         </p:nvCxnSpPr>
         <p:spPr>
           <a:xfrm flipV="1">
-            <a:off x="3957371" y="4403932"/>
-            <a:ext cx="2561" cy="681252"/>
+            <a:off x="3957371" y="4439424"/>
+            <a:ext cx="2561" cy="645760"/>
           </a:xfrm>
           <a:prstGeom prst="straightConnector1">
             <a:avLst/>
@@ -12799,8 +13003,8 @@
         </p:nvCxnSpPr>
         <p:spPr>
           <a:xfrm rot="5400000" flipH="1" flipV="1">
-            <a:off x="3462879" y="1581057"/>
-            <a:ext cx="1534166" cy="540060"/>
+            <a:off x="3530942" y="1595854"/>
+            <a:ext cx="1398041" cy="540060"/>
           </a:xfrm>
           <a:prstGeom prst="bentConnector2">
             <a:avLst/>
@@ -12838,8 +13042,8 @@
         </p:nvCxnSpPr>
         <p:spPr>
           <a:xfrm flipH="1">
-            <a:off x="2953915" y="3511051"/>
-            <a:ext cx="537965" cy="907"/>
+            <a:off x="2953915" y="3502164"/>
+            <a:ext cx="537965" cy="9794"/>
           </a:xfrm>
           <a:prstGeom prst="straightConnector1">
             <a:avLst/>

</xml_diff>